<commit_message>
Changes for Serverless London (November)
</commit_message>
<xml_diff>
--- a/hitchhiker systems.pptx
+++ b/hitchhiker systems.pptx
@@ -5,7 +5,7 @@
     <p:sldMasterId id="2147483648" r:id="rId1"/>
   </p:sldMasterIdLst>
   <p:notesMasterIdLst>
-    <p:notesMasterId r:id="rId18"/>
+    <p:notesMasterId r:id="rId19"/>
   </p:notesMasterIdLst>
   <p:sldIdLst>
     <p:sldId id="256" r:id="rId2"/>
@@ -13,17 +13,18 @@
     <p:sldId id="259" r:id="rId4"/>
     <p:sldId id="258" r:id="rId5"/>
     <p:sldId id="263" r:id="rId6"/>
-    <p:sldId id="260" r:id="rId7"/>
-    <p:sldId id="261" r:id="rId8"/>
-    <p:sldId id="264" r:id="rId9"/>
-    <p:sldId id="270" r:id="rId10"/>
-    <p:sldId id="265" r:id="rId11"/>
-    <p:sldId id="271" r:id="rId12"/>
-    <p:sldId id="266" r:id="rId13"/>
-    <p:sldId id="262" r:id="rId14"/>
-    <p:sldId id="269" r:id="rId15"/>
-    <p:sldId id="267" r:id="rId16"/>
-    <p:sldId id="268" r:id="rId17"/>
+    <p:sldId id="272" r:id="rId7"/>
+    <p:sldId id="260" r:id="rId8"/>
+    <p:sldId id="261" r:id="rId9"/>
+    <p:sldId id="264" r:id="rId10"/>
+    <p:sldId id="270" r:id="rId11"/>
+    <p:sldId id="265" r:id="rId12"/>
+    <p:sldId id="271" r:id="rId13"/>
+    <p:sldId id="266" r:id="rId14"/>
+    <p:sldId id="262" r:id="rId15"/>
+    <p:sldId id="269" r:id="rId16"/>
+    <p:sldId id="267" r:id="rId17"/>
+    <p:sldId id="268" r:id="rId18"/>
   </p:sldIdLst>
   <p:sldSz cx="12192000" cy="6858000"/>
   <p:notesSz cx="6858000" cy="9144000"/>
@@ -5661,7 +5662,7 @@
           <a:p>
             <a:fld id="{326D9653-A29E-48D1-A255-C30702B91C5A}" type="datetimeFigureOut">
               <a:rPr lang="en-IE" smtClean="0"/>
-              <a:t>26/04/2019</a:t>
+              <a:t>19/06/2019</a:t>
             </a:fld>
             <a:endParaRPr lang="en-IE"/>
           </a:p>
@@ -6115,7 +6116,7 @@
           <a:p>
             <a:fld id="{BEF28922-F286-42E5-8B45-0555F1675A4E}" type="slidenum">
               <a:rPr lang="en-IE" smtClean="0"/>
-              <a:t>10</a:t>
+              <a:t>11</a:t>
             </a:fld>
             <a:endParaRPr lang="en-IE"/>
           </a:p>
@@ -6221,7 +6222,7 @@
           <a:p>
             <a:fld id="{BEF28922-F286-42E5-8B45-0555F1675A4E}" type="slidenum">
               <a:rPr lang="en-IE" smtClean="0"/>
-              <a:t>11</a:t>
+              <a:t>12</a:t>
             </a:fld>
             <a:endParaRPr lang="en-IE"/>
           </a:p>
@@ -6329,7 +6330,7 @@
           <a:p>
             <a:fld id="{BEF28922-F286-42E5-8B45-0555F1675A4E}" type="slidenum">
               <a:rPr lang="en-IE" smtClean="0"/>
-              <a:t>12</a:t>
+              <a:t>13</a:t>
             </a:fld>
             <a:endParaRPr lang="en-IE"/>
           </a:p>
@@ -6428,7 +6429,7 @@
           <a:p>
             <a:fld id="{BEF28922-F286-42E5-8B45-0555F1675A4E}" type="slidenum">
               <a:rPr lang="en-IE" smtClean="0"/>
-              <a:t>13</a:t>
+              <a:t>14</a:t>
             </a:fld>
             <a:endParaRPr lang="en-IE"/>
           </a:p>
@@ -6664,7 +6665,7 @@
             </a:endParaRPr>
           </a:p>
           <a:p>
-            <a:endParaRPr lang="en-IE" sz="1200" b="1" kern="1200">
+            <a:endParaRPr lang="en-IE" sz="1200" b="1" kern="1200" dirty="0">
               <a:solidFill>
                 <a:schemeClr val="tx1"/>
               </a:solidFill>
@@ -6675,18 +6676,6 @@
             </a:endParaRPr>
           </a:p>
           <a:p>
-            <a:r>
-              <a:rPr lang="en-IE" sz="1200" b="1" kern="1200">
-                <a:solidFill>
-                  <a:schemeClr val="tx1"/>
-                </a:solidFill>
-                <a:effectLst/>
-                <a:latin typeface="+mn-lt"/>
-                <a:ea typeface="+mn-ea"/>
-                <a:cs typeface="+mn-cs"/>
-              </a:rPr>
-              <a:t>Azure </a:t>
-            </a:r>
             <a:r>
               <a:rPr lang="en-IE" sz="1200" b="1" kern="1200" dirty="0">
                 <a:solidFill>
@@ -6697,7 +6686,7 @@
                 <a:ea typeface="+mn-ea"/>
                 <a:cs typeface="+mn-cs"/>
               </a:rPr>
-              <a:t>AppendBlob</a:t>
+              <a:t>Azure AppendBlob</a:t>
             </a:r>
             <a:r>
               <a:rPr lang="en-IE" sz="1200" kern="1200" dirty="0">
@@ -6743,7 +6732,7 @@
           <a:p>
             <a:fld id="{BEF28922-F286-42E5-8B45-0555F1675A4E}" type="slidenum">
               <a:rPr lang="en-IE" smtClean="0"/>
-              <a:t>16</a:t>
+              <a:t>17</a:t>
             </a:fld>
             <a:endParaRPr lang="en-IE"/>
           </a:p>
@@ -7322,7 +7311,7 @@
           <a:p>
             <a:fld id="{BEF28922-F286-42E5-8B45-0555F1675A4E}" type="slidenum">
               <a:rPr lang="en-IE" smtClean="0"/>
-              <a:t>6</a:t>
+              <a:t>7</a:t>
             </a:fld>
             <a:endParaRPr lang="en-IE"/>
           </a:p>
@@ -7436,7 +7425,7 @@
           <a:p>
             <a:fld id="{BEF28922-F286-42E5-8B45-0555F1675A4E}" type="slidenum">
               <a:rPr lang="en-IE" smtClean="0"/>
-              <a:t>7</a:t>
+              <a:t>8</a:t>
             </a:fld>
             <a:endParaRPr lang="en-IE"/>
           </a:p>
@@ -7547,7 +7536,7 @@
           <a:p>
             <a:fld id="{BEF28922-F286-42E5-8B45-0555F1675A4E}" type="slidenum">
               <a:rPr lang="en-IE" smtClean="0"/>
-              <a:t>8</a:t>
+              <a:t>9</a:t>
             </a:fld>
             <a:endParaRPr lang="en-IE"/>
           </a:p>
@@ -7693,7 +7682,7 @@
           <a:p>
             <a:fld id="{BEF28922-F286-42E5-8B45-0555F1675A4E}" type="slidenum">
               <a:rPr lang="en-IE" smtClean="0"/>
-              <a:t>9</a:t>
+              <a:t>10</a:t>
             </a:fld>
             <a:endParaRPr lang="en-IE"/>
           </a:p>
@@ -7859,7 +7848,7 @@
           <a:p>
             <a:fld id="{793293DD-71E4-48E3-A9B8-5447206001DE}" type="datetimeFigureOut">
               <a:rPr lang="en-US" smtClean="0"/>
-              <a:t>4/26/2019</a:t>
+              <a:t>6/19/2019</a:t>
             </a:fld>
             <a:endParaRPr lang="en-US"/>
           </a:p>
@@ -8057,7 +8046,7 @@
           <a:p>
             <a:fld id="{793293DD-71E4-48E3-A9B8-5447206001DE}" type="datetimeFigureOut">
               <a:rPr lang="en-US" smtClean="0"/>
-              <a:t>4/26/2019</a:t>
+              <a:t>6/19/2019</a:t>
             </a:fld>
             <a:endParaRPr lang="en-US"/>
           </a:p>
@@ -8265,7 +8254,7 @@
           <a:p>
             <a:fld id="{793293DD-71E4-48E3-A9B8-5447206001DE}" type="datetimeFigureOut">
               <a:rPr lang="en-US" smtClean="0"/>
-              <a:t>4/26/2019</a:t>
+              <a:t>6/19/2019</a:t>
             </a:fld>
             <a:endParaRPr lang="en-US"/>
           </a:p>
@@ -8463,7 +8452,7 @@
           <a:p>
             <a:fld id="{793293DD-71E4-48E3-A9B8-5447206001DE}" type="datetimeFigureOut">
               <a:rPr lang="en-US" smtClean="0"/>
-              <a:t>4/26/2019</a:t>
+              <a:t>6/19/2019</a:t>
             </a:fld>
             <a:endParaRPr lang="en-US"/>
           </a:p>
@@ -8738,7 +8727,7 @@
           <a:p>
             <a:fld id="{793293DD-71E4-48E3-A9B8-5447206001DE}" type="datetimeFigureOut">
               <a:rPr lang="en-US" smtClean="0"/>
-              <a:t>4/26/2019</a:t>
+              <a:t>6/19/2019</a:t>
             </a:fld>
             <a:endParaRPr lang="en-US"/>
           </a:p>
@@ -9003,7 +8992,7 @@
           <a:p>
             <a:fld id="{793293DD-71E4-48E3-A9B8-5447206001DE}" type="datetimeFigureOut">
               <a:rPr lang="en-US" smtClean="0"/>
-              <a:t>4/26/2019</a:t>
+              <a:t>6/19/2019</a:t>
             </a:fld>
             <a:endParaRPr lang="en-US"/>
           </a:p>
@@ -9415,7 +9404,7 @@
           <a:p>
             <a:fld id="{793293DD-71E4-48E3-A9B8-5447206001DE}" type="datetimeFigureOut">
               <a:rPr lang="en-US" smtClean="0"/>
-              <a:t>4/26/2019</a:t>
+              <a:t>6/19/2019</a:t>
             </a:fld>
             <a:endParaRPr lang="en-US"/>
           </a:p>
@@ -9556,7 +9545,7 @@
           <a:p>
             <a:fld id="{793293DD-71E4-48E3-A9B8-5447206001DE}" type="datetimeFigureOut">
               <a:rPr lang="en-US" smtClean="0"/>
-              <a:t>4/26/2019</a:t>
+              <a:t>6/19/2019</a:t>
             </a:fld>
             <a:endParaRPr lang="en-US"/>
           </a:p>
@@ -9669,7 +9658,7 @@
           <a:p>
             <a:fld id="{793293DD-71E4-48E3-A9B8-5447206001DE}" type="datetimeFigureOut">
               <a:rPr lang="en-US" smtClean="0"/>
-              <a:t>4/26/2019</a:t>
+              <a:t>6/19/2019</a:t>
             </a:fld>
             <a:endParaRPr lang="en-US"/>
           </a:p>
@@ -9980,7 +9969,7 @@
           <a:p>
             <a:fld id="{793293DD-71E4-48E3-A9B8-5447206001DE}" type="datetimeFigureOut">
               <a:rPr lang="en-US" smtClean="0"/>
-              <a:t>4/26/2019</a:t>
+              <a:t>6/19/2019</a:t>
             </a:fld>
             <a:endParaRPr lang="en-US"/>
           </a:p>
@@ -10268,7 +10257,7 @@
           <a:p>
             <a:fld id="{793293DD-71E4-48E3-A9B8-5447206001DE}" type="datetimeFigureOut">
               <a:rPr lang="en-US" smtClean="0"/>
-              <a:t>4/26/2019</a:t>
+              <a:t>6/19/2019</a:t>
             </a:fld>
             <a:endParaRPr lang="en-US"/>
           </a:p>
@@ -10509,7 +10498,7 @@
           <a:p>
             <a:fld id="{793293DD-71E4-48E3-A9B8-5447206001DE}" type="datetimeFigureOut">
               <a:rPr lang="en-US" smtClean="0"/>
-              <a:t>4/26/2019</a:t>
+              <a:t>6/19/2019</a:t>
             </a:fld>
             <a:endParaRPr lang="en-US"/>
           </a:p>
@@ -11095,42 +11084,6 @@
           </a:prstGeom>
         </p:spPr>
       </p:pic>
-      <p:pic>
-        <p:nvPicPr>
-          <p:cNvPr id="8" name="Picture 7">
-            <a:extLst>
-              <a:ext uri="{FF2B5EF4-FFF2-40B4-BE49-F238E27FC236}">
-                <a16:creationId xmlns:a16="http://schemas.microsoft.com/office/drawing/2014/main" id="{E880426B-B144-41BF-9104-A32A598CC3E9}"/>
-              </a:ext>
-            </a:extLst>
-          </p:cNvPr>
-          <p:cNvPicPr>
-            <a:picLocks noChangeAspect="1"/>
-          </p:cNvPicPr>
-          <p:nvPr/>
-        </p:nvPicPr>
-        <p:blipFill>
-          <a:blip r:embed="rId5">
-            <a:extLst>
-              <a:ext uri="{28A0092B-C50C-407E-A947-70E740481C1C}">
-                <a14:useLocalDpi xmlns:a14="http://schemas.microsoft.com/office/drawing/2010/main" val="0"/>
-              </a:ext>
-            </a:extLst>
-          </a:blip>
-          <a:stretch>
-            <a:fillRect/>
-          </a:stretch>
-        </p:blipFill>
-        <p:spPr>
-          <a:xfrm>
-            <a:off x="333375" y="65088"/>
-            <a:ext cx="2381250" cy="2114550"/>
-          </a:xfrm>
-          <a:prstGeom prst="rect">
-            <a:avLst/>
-          </a:prstGeom>
-        </p:spPr>
-      </p:pic>
     </p:spTree>
     <p:extLst>
       <p:ext uri="{BB962C8B-B14F-4D97-AF65-F5344CB8AC3E}">
@@ -11145,6 +11098,515 @@
 </file>
 
 <file path=ppt/slides/slide10.xml><?xml version="1.0" encoding="utf-8"?>
+<p:sld xmlns:a="http://schemas.openxmlformats.org/drawingml/2006/main" xmlns:r="http://schemas.openxmlformats.org/officeDocument/2006/relationships" xmlns:p="http://schemas.openxmlformats.org/presentationml/2006/main">
+  <p:cSld>
+    <p:spTree>
+      <p:nvGrpSpPr>
+        <p:cNvPr id="1" name=""/>
+        <p:cNvGrpSpPr/>
+        <p:nvPr/>
+      </p:nvGrpSpPr>
+      <p:grpSpPr>
+        <a:xfrm>
+          <a:off x="0" y="0"/>
+          <a:ext cx="0" cy="0"/>
+          <a:chOff x="0" y="0"/>
+          <a:chExt cx="0" cy="0"/>
+        </a:xfrm>
+      </p:grpSpPr>
+      <p:pic>
+        <p:nvPicPr>
+          <p:cNvPr id="8" name="Picture 7">
+            <a:extLst>
+              <a:ext uri="{FF2B5EF4-FFF2-40B4-BE49-F238E27FC236}">
+                <a16:creationId xmlns:a16="http://schemas.microsoft.com/office/drawing/2014/main" id="{D1483B55-7AB7-4FE5-8E02-DD1393DDE894}"/>
+              </a:ext>
+            </a:extLst>
+          </p:cNvPr>
+          <p:cNvPicPr>
+            <a:picLocks noChangeAspect="1"/>
+          </p:cNvPicPr>
+          <p:nvPr/>
+        </p:nvPicPr>
+        <p:blipFill>
+          <a:blip r:embed="rId3"/>
+          <a:stretch>
+            <a:fillRect/>
+          </a:stretch>
+        </p:blipFill>
+        <p:spPr>
+          <a:xfrm>
+            <a:off x="174761" y="1954074"/>
+            <a:ext cx="11842478" cy="2148472"/>
+          </a:xfrm>
+          <a:prstGeom prst="rect">
+            <a:avLst/>
+          </a:prstGeom>
+          <a:ln w="38100" cap="sq">
+            <a:solidFill>
+              <a:srgbClr val="000000"/>
+            </a:solidFill>
+            <a:prstDash val="solid"/>
+            <a:miter lim="800000"/>
+          </a:ln>
+          <a:effectLst>
+            <a:outerShdw blurRad="50800" dist="38100" dir="2700000" algn="tl" rotWithShape="0">
+              <a:srgbClr val="000000">
+                <a:alpha val="43000"/>
+              </a:srgbClr>
+            </a:outerShdw>
+          </a:effectLst>
+        </p:spPr>
+      </p:pic>
+      <p:sp>
+        <p:nvSpPr>
+          <p:cNvPr id="2" name="Title 1">
+            <a:extLst>
+              <a:ext uri="{FF2B5EF4-FFF2-40B4-BE49-F238E27FC236}">
+                <a16:creationId xmlns:a16="http://schemas.microsoft.com/office/drawing/2014/main" id="{3FC686C3-2E45-4441-8C8B-DE1211D93D8B}"/>
+              </a:ext>
+            </a:extLst>
+          </p:cNvPr>
+          <p:cNvSpPr>
+            <a:spLocks noGrp="1"/>
+          </p:cNvSpPr>
+          <p:nvPr>
+            <p:ph type="title"/>
+          </p:nvPr>
+        </p:nvSpPr>
+        <p:spPr/>
+        <p:txBody>
+          <a:bodyPr/>
+          <a:lstStyle/>
+          <a:p>
+            <a:r>
+              <a:rPr lang="en-IE" dirty="0"/>
+              <a:t>Command orchestrator</a:t>
+            </a:r>
+            <a:endParaRPr lang="en-GB" dirty="0"/>
+          </a:p>
+        </p:txBody>
+      </p:sp>
+      <p:graphicFrame>
+        <p:nvGraphicFramePr>
+          <p:cNvPr id="4" name="Diagram 3">
+            <a:extLst>
+              <a:ext uri="{FF2B5EF4-FFF2-40B4-BE49-F238E27FC236}">
+                <a16:creationId xmlns:a16="http://schemas.microsoft.com/office/drawing/2014/main" id="{DF566D95-6532-4121-B981-DBB130720481}"/>
+              </a:ext>
+            </a:extLst>
+          </p:cNvPr>
+          <p:cNvGraphicFramePr/>
+          <p:nvPr>
+            <p:extLst>
+              <p:ext uri="{D42A27DB-BD31-4B8C-83A1-F6EECF244321}">
+                <p14:modId xmlns:p14="http://schemas.microsoft.com/office/powerpoint/2010/main" val="4226403412"/>
+              </p:ext>
+            </p:extLst>
+          </p:nvPr>
+        </p:nvGraphicFramePr>
+        <p:xfrm>
+          <a:off x="199701" y="5214840"/>
+          <a:ext cx="11992299" cy="1809750"/>
+        </p:xfrm>
+        <a:graphic>
+          <a:graphicData uri="http://schemas.openxmlformats.org/drawingml/2006/diagram">
+            <dgm:relIds xmlns:dgm="http://schemas.openxmlformats.org/drawingml/2006/diagram" xmlns:r="http://schemas.openxmlformats.org/officeDocument/2006/relationships" r:dm="rId4" r:lo="rId5" r:qs="rId6" r:cs="rId7"/>
+          </a:graphicData>
+        </a:graphic>
+      </p:graphicFrame>
+      <p:pic>
+        <p:nvPicPr>
+          <p:cNvPr id="6" name="Picture 5">
+            <a:extLst>
+              <a:ext uri="{FF2B5EF4-FFF2-40B4-BE49-F238E27FC236}">
+                <a16:creationId xmlns:a16="http://schemas.microsoft.com/office/drawing/2014/main" id="{7C62517D-57DA-4FA0-817D-C2271EA55C14}"/>
+              </a:ext>
+            </a:extLst>
+          </p:cNvPr>
+          <p:cNvPicPr>
+            <a:picLocks noChangeAspect="1"/>
+          </p:cNvPicPr>
+          <p:nvPr/>
+        </p:nvPicPr>
+        <p:blipFill>
+          <a:blip r:embed="rId9"/>
+          <a:stretch>
+            <a:fillRect/>
+          </a:stretch>
+        </p:blipFill>
+        <p:spPr>
+          <a:xfrm>
+            <a:off x="608859" y="1366549"/>
+            <a:ext cx="10612331" cy="4124901"/>
+          </a:xfrm>
+          <a:prstGeom prst="rect">
+            <a:avLst/>
+          </a:prstGeom>
+          <a:ln w="38100" cap="sq">
+            <a:solidFill>
+              <a:srgbClr val="000000"/>
+            </a:solidFill>
+            <a:prstDash val="solid"/>
+            <a:miter lim="800000"/>
+          </a:ln>
+          <a:effectLst>
+            <a:outerShdw blurRad="50800" dist="38100" dir="2700000" algn="tl" rotWithShape="0">
+              <a:srgbClr val="000000">
+                <a:alpha val="43000"/>
+              </a:srgbClr>
+            </a:outerShdw>
+          </a:effectLst>
+        </p:spPr>
+      </p:pic>
+      <p:pic>
+        <p:nvPicPr>
+          <p:cNvPr id="5" name="Picture 4">
+            <a:extLst>
+              <a:ext uri="{FF2B5EF4-FFF2-40B4-BE49-F238E27FC236}">
+                <a16:creationId xmlns:a16="http://schemas.microsoft.com/office/drawing/2014/main" id="{08396915-4242-40AC-A3B2-4C4A0B36AE3E}"/>
+              </a:ext>
+            </a:extLst>
+          </p:cNvPr>
+          <p:cNvPicPr>
+            <a:picLocks noChangeAspect="1"/>
+          </p:cNvPicPr>
+          <p:nvPr/>
+        </p:nvPicPr>
+        <p:blipFill>
+          <a:blip r:embed="rId10"/>
+          <a:stretch>
+            <a:fillRect/>
+          </a:stretch>
+        </p:blipFill>
+        <p:spPr>
+          <a:xfrm>
+            <a:off x="443164" y="1856792"/>
+            <a:ext cx="11626737" cy="2553420"/>
+          </a:xfrm>
+          <a:prstGeom prst="rect">
+            <a:avLst/>
+          </a:prstGeom>
+          <a:ln w="38100" cap="sq">
+            <a:solidFill>
+              <a:srgbClr val="000000"/>
+            </a:solidFill>
+            <a:prstDash val="solid"/>
+            <a:miter lim="800000"/>
+          </a:ln>
+          <a:effectLst>
+            <a:outerShdw blurRad="50800" dist="38100" dir="2700000" algn="tl" rotWithShape="0">
+              <a:srgbClr val="000000">
+                <a:alpha val="43000"/>
+              </a:srgbClr>
+            </a:outerShdw>
+          </a:effectLst>
+        </p:spPr>
+      </p:pic>
+      <p:pic>
+        <p:nvPicPr>
+          <p:cNvPr id="7" name="Picture 6">
+            <a:extLst>
+              <a:ext uri="{FF2B5EF4-FFF2-40B4-BE49-F238E27FC236}">
+                <a16:creationId xmlns:a16="http://schemas.microsoft.com/office/drawing/2014/main" id="{77A3E4F8-A795-46DE-9316-35E003C92DD9}"/>
+              </a:ext>
+            </a:extLst>
+          </p:cNvPr>
+          <p:cNvPicPr>
+            <a:picLocks noChangeAspect="1"/>
+          </p:cNvPicPr>
+          <p:nvPr/>
+        </p:nvPicPr>
+        <p:blipFill>
+          <a:blip r:embed="rId11"/>
+          <a:stretch>
+            <a:fillRect/>
+          </a:stretch>
+        </p:blipFill>
+        <p:spPr>
+          <a:xfrm>
+            <a:off x="248898" y="1474238"/>
+            <a:ext cx="11926344" cy="3834880"/>
+          </a:xfrm>
+          <a:prstGeom prst="rect">
+            <a:avLst/>
+          </a:prstGeom>
+          <a:ln w="38100" cap="sq">
+            <a:solidFill>
+              <a:srgbClr val="000000"/>
+            </a:solidFill>
+            <a:prstDash val="solid"/>
+            <a:miter lim="800000"/>
+          </a:ln>
+          <a:effectLst>
+            <a:outerShdw blurRad="50800" dist="38100" dir="2700000" algn="tl" rotWithShape="0">
+              <a:srgbClr val="000000">
+                <a:alpha val="43000"/>
+              </a:srgbClr>
+            </a:outerShdw>
+          </a:effectLst>
+        </p:spPr>
+      </p:pic>
+    </p:spTree>
+    <p:extLst>
+      <p:ext uri="{BB962C8B-B14F-4D97-AF65-F5344CB8AC3E}">
+        <p14:creationId xmlns:p14="http://schemas.microsoft.com/office/powerpoint/2010/main" val="956542851"/>
+      </p:ext>
+    </p:extLst>
+  </p:cSld>
+  <p:clrMapOvr>
+    <a:masterClrMapping/>
+  </p:clrMapOvr>
+  <p:timing>
+    <p:tnLst>
+      <p:par>
+        <p:cTn id="1" dur="indefinite" restart="never" nodeType="tmRoot">
+          <p:childTnLst>
+            <p:seq concurrent="1" nextAc="seek">
+              <p:cTn id="2" dur="indefinite" nodeType="mainSeq">
+                <p:childTnLst>
+                  <p:par>
+                    <p:cTn id="3" fill="hold">
+                      <p:stCondLst>
+                        <p:cond delay="indefinite"/>
+                      </p:stCondLst>
+                      <p:childTnLst>
+                        <p:par>
+                          <p:cTn id="4" fill="hold">
+                            <p:stCondLst>
+                              <p:cond delay="0"/>
+                            </p:stCondLst>
+                            <p:childTnLst>
+                              <p:par>
+                                <p:cTn id="5" presetID="1" presetClass="exit" presetSubtype="0" fill="hold" nodeType="clickEffect">
+                                  <p:stCondLst>
+                                    <p:cond delay="0"/>
+                                  </p:stCondLst>
+                                  <p:childTnLst>
+                                    <p:set>
+                                      <p:cBhvr>
+                                        <p:cTn id="6" dur="1" fill="hold">
+                                          <p:stCondLst>
+                                            <p:cond delay="0"/>
+                                          </p:stCondLst>
+                                        </p:cTn>
+                                        <p:tgtEl>
+                                          <p:spTgt spid="5"/>
+                                        </p:tgtEl>
+                                        <p:attrNameLst>
+                                          <p:attrName>style.visibility</p:attrName>
+                                        </p:attrNameLst>
+                                      </p:cBhvr>
+                                      <p:to>
+                                        <p:strVal val="hidden"/>
+                                      </p:to>
+                                    </p:set>
+                                  </p:childTnLst>
+                                </p:cTn>
+                              </p:par>
+                              <p:par>
+                                <p:cTn id="7" presetID="1" presetClass="entr" presetSubtype="0" fill="hold" nodeType="withEffect">
+                                  <p:stCondLst>
+                                    <p:cond delay="0"/>
+                                  </p:stCondLst>
+                                  <p:childTnLst>
+                                    <p:set>
+                                      <p:cBhvr>
+                                        <p:cTn id="8" dur="1" fill="hold">
+                                          <p:stCondLst>
+                                            <p:cond delay="0"/>
+                                          </p:stCondLst>
+                                        </p:cTn>
+                                        <p:tgtEl>
+                                          <p:spTgt spid="6"/>
+                                        </p:tgtEl>
+                                        <p:attrNameLst>
+                                          <p:attrName>style.visibility</p:attrName>
+                                        </p:attrNameLst>
+                                      </p:cBhvr>
+                                      <p:to>
+                                        <p:strVal val="visible"/>
+                                      </p:to>
+                                    </p:set>
+                                  </p:childTnLst>
+                                </p:cTn>
+                              </p:par>
+                            </p:childTnLst>
+                          </p:cTn>
+                        </p:par>
+                      </p:childTnLst>
+                    </p:cTn>
+                  </p:par>
+                  <p:par>
+                    <p:cTn id="9" fill="hold">
+                      <p:stCondLst>
+                        <p:cond delay="indefinite"/>
+                      </p:stCondLst>
+                      <p:childTnLst>
+                        <p:par>
+                          <p:cTn id="10" fill="hold">
+                            <p:stCondLst>
+                              <p:cond delay="0"/>
+                            </p:stCondLst>
+                            <p:childTnLst>
+                              <p:par>
+                                <p:cTn id="11" presetID="1" presetClass="entr" presetSubtype="0" fill="hold" nodeType="clickEffect">
+                                  <p:stCondLst>
+                                    <p:cond delay="0"/>
+                                  </p:stCondLst>
+                                  <p:childTnLst>
+                                    <p:set>
+                                      <p:cBhvr>
+                                        <p:cTn id="12" dur="1" fill="hold">
+                                          <p:stCondLst>
+                                            <p:cond delay="0"/>
+                                          </p:stCondLst>
+                                        </p:cTn>
+                                        <p:tgtEl>
+                                          <p:spTgt spid="7"/>
+                                        </p:tgtEl>
+                                        <p:attrNameLst>
+                                          <p:attrName>style.visibility</p:attrName>
+                                        </p:attrNameLst>
+                                      </p:cBhvr>
+                                      <p:to>
+                                        <p:strVal val="visible"/>
+                                      </p:to>
+                                    </p:set>
+                                  </p:childTnLst>
+                                </p:cTn>
+                              </p:par>
+                              <p:par>
+                                <p:cTn id="13" presetID="1" presetClass="exit" presetSubtype="0" fill="hold" nodeType="withEffect">
+                                  <p:stCondLst>
+                                    <p:cond delay="0"/>
+                                  </p:stCondLst>
+                                  <p:childTnLst>
+                                    <p:set>
+                                      <p:cBhvr>
+                                        <p:cTn id="14" dur="1" fill="hold">
+                                          <p:stCondLst>
+                                            <p:cond delay="0"/>
+                                          </p:stCondLst>
+                                        </p:cTn>
+                                        <p:tgtEl>
+                                          <p:spTgt spid="6"/>
+                                        </p:tgtEl>
+                                        <p:attrNameLst>
+                                          <p:attrName>style.visibility</p:attrName>
+                                        </p:attrNameLst>
+                                      </p:cBhvr>
+                                      <p:to>
+                                        <p:strVal val="hidden"/>
+                                      </p:to>
+                                    </p:set>
+                                  </p:childTnLst>
+                                </p:cTn>
+                              </p:par>
+                            </p:childTnLst>
+                          </p:cTn>
+                        </p:par>
+                      </p:childTnLst>
+                    </p:cTn>
+                  </p:par>
+                  <p:par>
+                    <p:cTn id="15" fill="hold">
+                      <p:stCondLst>
+                        <p:cond delay="indefinite"/>
+                      </p:stCondLst>
+                      <p:childTnLst>
+                        <p:par>
+                          <p:cTn id="16" fill="hold">
+                            <p:stCondLst>
+                              <p:cond delay="0"/>
+                            </p:stCondLst>
+                            <p:childTnLst>
+                              <p:par>
+                                <p:cTn id="17" presetID="1" presetClass="entr" presetSubtype="0" fill="hold" nodeType="clickEffect">
+                                  <p:stCondLst>
+                                    <p:cond delay="0"/>
+                                  </p:stCondLst>
+                                  <p:childTnLst>
+                                    <p:set>
+                                      <p:cBhvr>
+                                        <p:cTn id="18" dur="1" fill="hold">
+                                          <p:stCondLst>
+                                            <p:cond delay="0"/>
+                                          </p:stCondLst>
+                                        </p:cTn>
+                                        <p:tgtEl>
+                                          <p:spTgt spid="8"/>
+                                        </p:tgtEl>
+                                        <p:attrNameLst>
+                                          <p:attrName>style.visibility</p:attrName>
+                                        </p:attrNameLst>
+                                      </p:cBhvr>
+                                      <p:to>
+                                        <p:strVal val="visible"/>
+                                      </p:to>
+                                    </p:set>
+                                  </p:childTnLst>
+                                </p:cTn>
+                              </p:par>
+                              <p:par>
+                                <p:cTn id="19" presetID="1" presetClass="exit" presetSubtype="0" fill="hold" nodeType="withEffect">
+                                  <p:stCondLst>
+                                    <p:cond delay="0"/>
+                                  </p:stCondLst>
+                                  <p:childTnLst>
+                                    <p:set>
+                                      <p:cBhvr>
+                                        <p:cTn id="20" dur="1" fill="hold">
+                                          <p:stCondLst>
+                                            <p:cond delay="0"/>
+                                          </p:stCondLst>
+                                        </p:cTn>
+                                        <p:tgtEl>
+                                          <p:spTgt spid="7"/>
+                                        </p:tgtEl>
+                                        <p:attrNameLst>
+                                          <p:attrName>style.visibility</p:attrName>
+                                        </p:attrNameLst>
+                                      </p:cBhvr>
+                                      <p:to>
+                                        <p:strVal val="hidden"/>
+                                      </p:to>
+                                    </p:set>
+                                  </p:childTnLst>
+                                </p:cTn>
+                              </p:par>
+                            </p:childTnLst>
+                          </p:cTn>
+                        </p:par>
+                      </p:childTnLst>
+                    </p:cTn>
+                  </p:par>
+                </p:childTnLst>
+              </p:cTn>
+              <p:prevCondLst>
+                <p:cond evt="onPrev" delay="0">
+                  <p:tgtEl>
+                    <p:sldTgt/>
+                  </p:tgtEl>
+                </p:cond>
+              </p:prevCondLst>
+              <p:nextCondLst>
+                <p:cond evt="onNext" delay="0">
+                  <p:tgtEl>
+                    <p:sldTgt/>
+                  </p:tgtEl>
+                </p:cond>
+              </p:nextCondLst>
+            </p:seq>
+          </p:childTnLst>
+        </p:cTn>
+      </p:par>
+    </p:tnLst>
+  </p:timing>
+</p:sld>
+</file>
+
+<file path=ppt/slides/slide11.xml><?xml version="1.0" encoding="utf-8"?>
 <p:sld xmlns:a="http://schemas.openxmlformats.org/drawingml/2006/main" xmlns:r="http://schemas.openxmlformats.org/officeDocument/2006/relationships" xmlns:p="http://schemas.openxmlformats.org/presentationml/2006/main">
   <p:cSld>
     <p:spTree>
@@ -12976,7 +13438,7 @@
 </p:sld>
 </file>
 
-<file path=ppt/slides/slide11.xml><?xml version="1.0" encoding="utf-8"?>
+<file path=ppt/slides/slide12.xml><?xml version="1.0" encoding="utf-8"?>
 <p:sld xmlns:a="http://schemas.openxmlformats.org/drawingml/2006/main" xmlns:r="http://schemas.openxmlformats.org/officeDocument/2006/relationships" xmlns:p="http://schemas.openxmlformats.org/presentationml/2006/main">
   <p:cSld>
     <p:spTree>
@@ -13259,7 +13721,7 @@
 </p:sld>
 </file>
 
-<file path=ppt/slides/slide12.xml><?xml version="1.0" encoding="utf-8"?>
+<file path=ppt/slides/slide13.xml><?xml version="1.0" encoding="utf-8"?>
 <p:sld xmlns:a="http://schemas.openxmlformats.org/drawingml/2006/main" xmlns:r="http://schemas.openxmlformats.org/officeDocument/2006/relationships" xmlns:p="http://schemas.openxmlformats.org/presentationml/2006/main">
   <p:cSld>
     <p:spTree>
@@ -13741,7 +14203,7 @@
 </p:sld>
 </file>
 
-<file path=ppt/slides/slide13.xml><?xml version="1.0" encoding="utf-8"?>
+<file path=ppt/slides/slide14.xml><?xml version="1.0" encoding="utf-8"?>
 <p:sld xmlns:a="http://schemas.openxmlformats.org/drawingml/2006/main" xmlns:r="http://schemas.openxmlformats.org/officeDocument/2006/relationships" xmlns:p="http://schemas.openxmlformats.org/presentationml/2006/main">
   <p:cSld>
     <p:spTree>
@@ -14034,7 +14496,7 @@
 </p:sld>
 </file>
 
-<file path=ppt/slides/slide14.xml><?xml version="1.0" encoding="utf-8"?>
+<file path=ppt/slides/slide15.xml><?xml version="1.0" encoding="utf-8"?>
 <p:sld xmlns:a="http://schemas.openxmlformats.org/drawingml/2006/main" xmlns:r="http://schemas.openxmlformats.org/officeDocument/2006/relationships" xmlns:p="http://schemas.openxmlformats.org/presentationml/2006/main">
   <p:cSld>
     <p:spTree>
@@ -14548,7 +15010,7 @@
 </p:sld>
 </file>
 
-<file path=ppt/slides/slide15.xml><?xml version="1.0" encoding="utf-8"?>
+<file path=ppt/slides/slide16.xml><?xml version="1.0" encoding="utf-8"?>
 <p:sld xmlns:a="http://schemas.openxmlformats.org/drawingml/2006/main" xmlns:r="http://schemas.openxmlformats.org/officeDocument/2006/relationships" xmlns:p="http://schemas.openxmlformats.org/presentationml/2006/main">
   <p:cSld>
     <p:spTree>
@@ -14723,7 +15185,7 @@
 </p:sld>
 </file>
 
-<file path=ppt/slides/slide16.xml><?xml version="1.0" encoding="utf-8"?>
+<file path=ppt/slides/slide17.xml><?xml version="1.0" encoding="utf-8"?>
 <p:sld xmlns:a="http://schemas.openxmlformats.org/drawingml/2006/main" xmlns:r="http://schemas.openxmlformats.org/officeDocument/2006/relationships" xmlns:p="http://schemas.openxmlformats.org/presentationml/2006/main">
   <p:cSld>
     <p:spTree>
@@ -15398,6 +15860,47 @@
                 </a:solidFill>
               </a:rPr>
               <a:t>https://github.com/MerrionComputing/AzureFunctions-TheLongRun-Leagues</a:t>
+            </a:r>
+          </a:p>
+        </p:txBody>
+      </p:sp>
+      <p:sp>
+        <p:nvSpPr>
+          <p:cNvPr id="24" name="TextBox 23">
+            <a:extLst>
+              <a:ext uri="{FF2B5EF4-FFF2-40B4-BE49-F238E27FC236}">
+                <a16:creationId xmlns:a16="http://schemas.microsoft.com/office/drawing/2014/main" id="{4FDA6B8B-91B9-45B7-BF99-D0E4085AD712}"/>
+              </a:ext>
+            </a:extLst>
+          </p:cNvPr>
+          <p:cNvSpPr txBox="1"/>
+          <p:nvPr/>
+        </p:nvSpPr>
+        <p:spPr>
+          <a:xfrm>
+            <a:off x="60702" y="6123543"/>
+            <a:ext cx="7468327" cy="369332"/>
+          </a:xfrm>
+          <a:prstGeom prst="rect">
+            <a:avLst/>
+          </a:prstGeom>
+          <a:noFill/>
+        </p:spPr>
+        <p:txBody>
+          <a:bodyPr wrap="none" rtlCol="0">
+            <a:spAutoFit/>
+          </a:bodyPr>
+          <a:lstStyle/>
+          <a:p>
+            <a:r>
+              <a:rPr lang="en-GB" u="sng" dirty="0">
+                <a:solidFill>
+                  <a:schemeClr val="accent1">
+                    <a:lumMod val="75000"/>
+                  </a:schemeClr>
+                </a:solidFill>
+              </a:rPr>
+              <a:t>https://github.com/MerrionComputing/EventsSourcing-on-Azure-Functions</a:t>
             </a:r>
           </a:p>
         </p:txBody>
@@ -17066,6 +17569,140 @@
           <p:cNvPr id="2" name="Title 1">
             <a:extLst>
               <a:ext uri="{FF2B5EF4-FFF2-40B4-BE49-F238E27FC236}">
+                <a16:creationId xmlns:a16="http://schemas.microsoft.com/office/drawing/2014/main" id="{8D47F71B-2492-4B68-AEA4-BB8EE748AA84}"/>
+              </a:ext>
+            </a:extLst>
+          </p:cNvPr>
+          <p:cNvSpPr>
+            <a:spLocks noGrp="1"/>
+          </p:cNvSpPr>
+          <p:nvPr>
+            <p:ph type="title"/>
+          </p:nvPr>
+        </p:nvSpPr>
+        <p:spPr/>
+        <p:txBody>
+          <a:bodyPr/>
+          <a:lstStyle/>
+          <a:p>
+            <a:r>
+              <a:rPr lang="en-IE" b="1" dirty="0"/>
+              <a:t>Event sourcing </a:t>
+            </a:r>
+            <a:r>
+              <a:rPr lang="en-IE" dirty="0"/>
+              <a:t>on</a:t>
+            </a:r>
+            <a:r>
+              <a:rPr lang="en-IE" b="1" dirty="0"/>
+              <a:t> Azure functions </a:t>
+            </a:r>
+            <a:br>
+              <a:rPr lang="en-IE" b="1" dirty="0"/>
+            </a:br>
+            <a:r>
+              <a:rPr lang="en-IE" dirty="0"/>
+              <a:t>code example</a:t>
+            </a:r>
+            <a:endParaRPr lang="en-US" dirty="0"/>
+          </a:p>
+        </p:txBody>
+      </p:sp>
+      <p:pic>
+        <p:nvPicPr>
+          <p:cNvPr id="5" name="Picture 4" descr="A picture containing indoor, person, sitting&#10;&#10;Description automatically generated">
+            <a:extLst>
+              <a:ext uri="{FF2B5EF4-FFF2-40B4-BE49-F238E27FC236}">
+                <a16:creationId xmlns:a16="http://schemas.microsoft.com/office/drawing/2014/main" id="{C32DEA63-5265-44B5-83CE-DF2551F99BDA}"/>
+              </a:ext>
+            </a:extLst>
+          </p:cNvPr>
+          <p:cNvPicPr>
+            <a:picLocks noChangeAspect="1"/>
+          </p:cNvPicPr>
+          <p:nvPr/>
+        </p:nvPicPr>
+        <p:blipFill>
+          <a:blip r:embed="rId2">
+            <a:extLst>
+              <a:ext uri="{28A0092B-C50C-407E-A947-70E740481C1C}">
+                <a14:useLocalDpi xmlns:a14="http://schemas.microsoft.com/office/drawing/2010/main" val="0"/>
+              </a:ext>
+            </a:extLst>
+          </a:blip>
+          <a:stretch>
+            <a:fillRect/>
+          </a:stretch>
+        </p:blipFill>
+        <p:spPr>
+          <a:xfrm>
+            <a:off x="4324067" y="1893023"/>
+            <a:ext cx="3968907" cy="4286420"/>
+          </a:xfrm>
+          <a:prstGeom prst="ellipse">
+            <a:avLst/>
+          </a:prstGeom>
+          <a:ln w="63500" cap="rnd">
+            <a:solidFill>
+              <a:srgbClr val="333333"/>
+            </a:solidFill>
+          </a:ln>
+          <a:effectLst>
+            <a:outerShdw blurRad="381000" dist="292100" dir="5400000" sx="-80000" sy="-18000" rotWithShape="0">
+              <a:srgbClr val="000000">
+                <a:alpha val="22000"/>
+              </a:srgbClr>
+            </a:outerShdw>
+          </a:effectLst>
+          <a:scene3d>
+            <a:camera prst="orthographicFront"/>
+            <a:lightRig rig="contrasting" dir="t">
+              <a:rot lat="0" lon="0" rev="3000000"/>
+            </a:lightRig>
+          </a:scene3d>
+          <a:sp3d contourW="7620">
+            <a:bevelT w="95250" h="31750"/>
+            <a:contourClr>
+              <a:srgbClr val="333333"/>
+            </a:contourClr>
+          </a:sp3d>
+        </p:spPr>
+      </p:pic>
+    </p:spTree>
+    <p:extLst>
+      <p:ext uri="{BB962C8B-B14F-4D97-AF65-F5344CB8AC3E}">
+        <p14:creationId xmlns:p14="http://schemas.microsoft.com/office/powerpoint/2010/main" val="3718471643"/>
+      </p:ext>
+    </p:extLst>
+  </p:cSld>
+  <p:clrMapOvr>
+    <a:masterClrMapping/>
+  </p:clrMapOvr>
+</p:sld>
+</file>
+
+<file path=ppt/slides/slide7.xml><?xml version="1.0" encoding="utf-8"?>
+<p:sld xmlns:a="http://schemas.openxmlformats.org/drawingml/2006/main" xmlns:r="http://schemas.openxmlformats.org/officeDocument/2006/relationships" xmlns:p="http://schemas.openxmlformats.org/presentationml/2006/main">
+  <p:cSld>
+    <p:spTree>
+      <p:nvGrpSpPr>
+        <p:cNvPr id="1" name=""/>
+        <p:cNvGrpSpPr/>
+        <p:nvPr/>
+      </p:nvGrpSpPr>
+      <p:grpSpPr>
+        <a:xfrm>
+          <a:off x="0" y="0"/>
+          <a:ext cx="0" cy="0"/>
+          <a:chOff x="0" y="0"/>
+          <a:chExt cx="0" cy="0"/>
+        </a:xfrm>
+      </p:grpSpPr>
+      <p:sp>
+        <p:nvSpPr>
+          <p:cNvPr id="2" name="Title 1">
+            <a:extLst>
+              <a:ext uri="{FF2B5EF4-FFF2-40B4-BE49-F238E27FC236}">
                 <a16:creationId xmlns:a16="http://schemas.microsoft.com/office/drawing/2014/main" id="{E8DCFB5D-BA2B-45D2-9F5C-6EB92558CD80}"/>
               </a:ext>
             </a:extLst>
@@ -17928,7 +18565,7 @@
 </p:sld>
 </file>
 
-<file path=ppt/slides/slide7.xml><?xml version="1.0" encoding="utf-8"?>
+<file path=ppt/slides/slide8.xml><?xml version="1.0" encoding="utf-8"?>
 <p:sld xmlns:a="http://schemas.openxmlformats.org/drawingml/2006/main" xmlns:r="http://schemas.openxmlformats.org/officeDocument/2006/relationships" xmlns:p="http://schemas.openxmlformats.org/presentationml/2006/main">
   <p:cSld>
     <p:spTree>
@@ -19236,7 +19873,7 @@
 </p:sld>
 </file>
 
-<file path=ppt/slides/slide8.xml><?xml version="1.0" encoding="utf-8"?>
+<file path=ppt/slides/slide9.xml><?xml version="1.0" encoding="utf-8"?>
 <p:sld xmlns:a="http://schemas.openxmlformats.org/drawingml/2006/main" xmlns:r="http://schemas.openxmlformats.org/officeDocument/2006/relationships" xmlns:p="http://schemas.openxmlformats.org/presentationml/2006/main">
   <p:cSld>
     <p:spTree>
@@ -20521,515 +21158,6 @@
       <p:bldP spid="21" grpId="0"/>
       <p:bldP spid="26" grpId="0"/>
     </p:bldLst>
-  </p:timing>
-</p:sld>
-</file>
-
-<file path=ppt/slides/slide9.xml><?xml version="1.0" encoding="utf-8"?>
-<p:sld xmlns:a="http://schemas.openxmlformats.org/drawingml/2006/main" xmlns:r="http://schemas.openxmlformats.org/officeDocument/2006/relationships" xmlns:p="http://schemas.openxmlformats.org/presentationml/2006/main">
-  <p:cSld>
-    <p:spTree>
-      <p:nvGrpSpPr>
-        <p:cNvPr id="1" name=""/>
-        <p:cNvGrpSpPr/>
-        <p:nvPr/>
-      </p:nvGrpSpPr>
-      <p:grpSpPr>
-        <a:xfrm>
-          <a:off x="0" y="0"/>
-          <a:ext cx="0" cy="0"/>
-          <a:chOff x="0" y="0"/>
-          <a:chExt cx="0" cy="0"/>
-        </a:xfrm>
-      </p:grpSpPr>
-      <p:pic>
-        <p:nvPicPr>
-          <p:cNvPr id="8" name="Picture 7">
-            <a:extLst>
-              <a:ext uri="{FF2B5EF4-FFF2-40B4-BE49-F238E27FC236}">
-                <a16:creationId xmlns:a16="http://schemas.microsoft.com/office/drawing/2014/main" id="{D1483B55-7AB7-4FE5-8E02-DD1393DDE894}"/>
-              </a:ext>
-            </a:extLst>
-          </p:cNvPr>
-          <p:cNvPicPr>
-            <a:picLocks noChangeAspect="1"/>
-          </p:cNvPicPr>
-          <p:nvPr/>
-        </p:nvPicPr>
-        <p:blipFill>
-          <a:blip r:embed="rId3"/>
-          <a:stretch>
-            <a:fillRect/>
-          </a:stretch>
-        </p:blipFill>
-        <p:spPr>
-          <a:xfrm>
-            <a:off x="174761" y="1954074"/>
-            <a:ext cx="11842478" cy="2148472"/>
-          </a:xfrm>
-          <a:prstGeom prst="rect">
-            <a:avLst/>
-          </a:prstGeom>
-          <a:ln w="38100" cap="sq">
-            <a:solidFill>
-              <a:srgbClr val="000000"/>
-            </a:solidFill>
-            <a:prstDash val="solid"/>
-            <a:miter lim="800000"/>
-          </a:ln>
-          <a:effectLst>
-            <a:outerShdw blurRad="50800" dist="38100" dir="2700000" algn="tl" rotWithShape="0">
-              <a:srgbClr val="000000">
-                <a:alpha val="43000"/>
-              </a:srgbClr>
-            </a:outerShdw>
-          </a:effectLst>
-        </p:spPr>
-      </p:pic>
-      <p:sp>
-        <p:nvSpPr>
-          <p:cNvPr id="2" name="Title 1">
-            <a:extLst>
-              <a:ext uri="{FF2B5EF4-FFF2-40B4-BE49-F238E27FC236}">
-                <a16:creationId xmlns:a16="http://schemas.microsoft.com/office/drawing/2014/main" id="{3FC686C3-2E45-4441-8C8B-DE1211D93D8B}"/>
-              </a:ext>
-            </a:extLst>
-          </p:cNvPr>
-          <p:cNvSpPr>
-            <a:spLocks noGrp="1"/>
-          </p:cNvSpPr>
-          <p:nvPr>
-            <p:ph type="title"/>
-          </p:nvPr>
-        </p:nvSpPr>
-        <p:spPr/>
-        <p:txBody>
-          <a:bodyPr/>
-          <a:lstStyle/>
-          <a:p>
-            <a:r>
-              <a:rPr lang="en-IE" dirty="0"/>
-              <a:t>Command orchestrator</a:t>
-            </a:r>
-            <a:endParaRPr lang="en-GB" dirty="0"/>
-          </a:p>
-        </p:txBody>
-      </p:sp>
-      <p:graphicFrame>
-        <p:nvGraphicFramePr>
-          <p:cNvPr id="4" name="Diagram 3">
-            <a:extLst>
-              <a:ext uri="{FF2B5EF4-FFF2-40B4-BE49-F238E27FC236}">
-                <a16:creationId xmlns:a16="http://schemas.microsoft.com/office/drawing/2014/main" id="{DF566D95-6532-4121-B981-DBB130720481}"/>
-              </a:ext>
-            </a:extLst>
-          </p:cNvPr>
-          <p:cNvGraphicFramePr/>
-          <p:nvPr>
-            <p:extLst>
-              <p:ext uri="{D42A27DB-BD31-4B8C-83A1-F6EECF244321}">
-                <p14:modId xmlns:p14="http://schemas.microsoft.com/office/powerpoint/2010/main" val="4226403412"/>
-              </p:ext>
-            </p:extLst>
-          </p:nvPr>
-        </p:nvGraphicFramePr>
-        <p:xfrm>
-          <a:off x="199701" y="5214840"/>
-          <a:ext cx="11992299" cy="1809750"/>
-        </p:xfrm>
-        <a:graphic>
-          <a:graphicData uri="http://schemas.openxmlformats.org/drawingml/2006/diagram">
-            <dgm:relIds xmlns:dgm="http://schemas.openxmlformats.org/drawingml/2006/diagram" xmlns:r="http://schemas.openxmlformats.org/officeDocument/2006/relationships" r:dm="rId4" r:lo="rId5" r:qs="rId6" r:cs="rId7"/>
-          </a:graphicData>
-        </a:graphic>
-      </p:graphicFrame>
-      <p:pic>
-        <p:nvPicPr>
-          <p:cNvPr id="6" name="Picture 5">
-            <a:extLst>
-              <a:ext uri="{FF2B5EF4-FFF2-40B4-BE49-F238E27FC236}">
-                <a16:creationId xmlns:a16="http://schemas.microsoft.com/office/drawing/2014/main" id="{7C62517D-57DA-4FA0-817D-C2271EA55C14}"/>
-              </a:ext>
-            </a:extLst>
-          </p:cNvPr>
-          <p:cNvPicPr>
-            <a:picLocks noChangeAspect="1"/>
-          </p:cNvPicPr>
-          <p:nvPr/>
-        </p:nvPicPr>
-        <p:blipFill>
-          <a:blip r:embed="rId9"/>
-          <a:stretch>
-            <a:fillRect/>
-          </a:stretch>
-        </p:blipFill>
-        <p:spPr>
-          <a:xfrm>
-            <a:off x="608859" y="1366549"/>
-            <a:ext cx="10612331" cy="4124901"/>
-          </a:xfrm>
-          <a:prstGeom prst="rect">
-            <a:avLst/>
-          </a:prstGeom>
-          <a:ln w="38100" cap="sq">
-            <a:solidFill>
-              <a:srgbClr val="000000"/>
-            </a:solidFill>
-            <a:prstDash val="solid"/>
-            <a:miter lim="800000"/>
-          </a:ln>
-          <a:effectLst>
-            <a:outerShdw blurRad="50800" dist="38100" dir="2700000" algn="tl" rotWithShape="0">
-              <a:srgbClr val="000000">
-                <a:alpha val="43000"/>
-              </a:srgbClr>
-            </a:outerShdw>
-          </a:effectLst>
-        </p:spPr>
-      </p:pic>
-      <p:pic>
-        <p:nvPicPr>
-          <p:cNvPr id="5" name="Picture 4">
-            <a:extLst>
-              <a:ext uri="{FF2B5EF4-FFF2-40B4-BE49-F238E27FC236}">
-                <a16:creationId xmlns:a16="http://schemas.microsoft.com/office/drawing/2014/main" id="{08396915-4242-40AC-A3B2-4C4A0B36AE3E}"/>
-              </a:ext>
-            </a:extLst>
-          </p:cNvPr>
-          <p:cNvPicPr>
-            <a:picLocks noChangeAspect="1"/>
-          </p:cNvPicPr>
-          <p:nvPr/>
-        </p:nvPicPr>
-        <p:blipFill>
-          <a:blip r:embed="rId10"/>
-          <a:stretch>
-            <a:fillRect/>
-          </a:stretch>
-        </p:blipFill>
-        <p:spPr>
-          <a:xfrm>
-            <a:off x="443164" y="1856792"/>
-            <a:ext cx="11626737" cy="2553420"/>
-          </a:xfrm>
-          <a:prstGeom prst="rect">
-            <a:avLst/>
-          </a:prstGeom>
-          <a:ln w="38100" cap="sq">
-            <a:solidFill>
-              <a:srgbClr val="000000"/>
-            </a:solidFill>
-            <a:prstDash val="solid"/>
-            <a:miter lim="800000"/>
-          </a:ln>
-          <a:effectLst>
-            <a:outerShdw blurRad="50800" dist="38100" dir="2700000" algn="tl" rotWithShape="0">
-              <a:srgbClr val="000000">
-                <a:alpha val="43000"/>
-              </a:srgbClr>
-            </a:outerShdw>
-          </a:effectLst>
-        </p:spPr>
-      </p:pic>
-      <p:pic>
-        <p:nvPicPr>
-          <p:cNvPr id="7" name="Picture 6">
-            <a:extLst>
-              <a:ext uri="{FF2B5EF4-FFF2-40B4-BE49-F238E27FC236}">
-                <a16:creationId xmlns:a16="http://schemas.microsoft.com/office/drawing/2014/main" id="{77A3E4F8-A795-46DE-9316-35E003C92DD9}"/>
-              </a:ext>
-            </a:extLst>
-          </p:cNvPr>
-          <p:cNvPicPr>
-            <a:picLocks noChangeAspect="1"/>
-          </p:cNvPicPr>
-          <p:nvPr/>
-        </p:nvPicPr>
-        <p:blipFill>
-          <a:blip r:embed="rId11"/>
-          <a:stretch>
-            <a:fillRect/>
-          </a:stretch>
-        </p:blipFill>
-        <p:spPr>
-          <a:xfrm>
-            <a:off x="248898" y="1474238"/>
-            <a:ext cx="11926344" cy="3834880"/>
-          </a:xfrm>
-          <a:prstGeom prst="rect">
-            <a:avLst/>
-          </a:prstGeom>
-          <a:ln w="38100" cap="sq">
-            <a:solidFill>
-              <a:srgbClr val="000000"/>
-            </a:solidFill>
-            <a:prstDash val="solid"/>
-            <a:miter lim="800000"/>
-          </a:ln>
-          <a:effectLst>
-            <a:outerShdw blurRad="50800" dist="38100" dir="2700000" algn="tl" rotWithShape="0">
-              <a:srgbClr val="000000">
-                <a:alpha val="43000"/>
-              </a:srgbClr>
-            </a:outerShdw>
-          </a:effectLst>
-        </p:spPr>
-      </p:pic>
-    </p:spTree>
-    <p:extLst>
-      <p:ext uri="{BB962C8B-B14F-4D97-AF65-F5344CB8AC3E}">
-        <p14:creationId xmlns:p14="http://schemas.microsoft.com/office/powerpoint/2010/main" val="956542851"/>
-      </p:ext>
-    </p:extLst>
-  </p:cSld>
-  <p:clrMapOvr>
-    <a:masterClrMapping/>
-  </p:clrMapOvr>
-  <p:timing>
-    <p:tnLst>
-      <p:par>
-        <p:cTn id="1" dur="indefinite" restart="never" nodeType="tmRoot">
-          <p:childTnLst>
-            <p:seq concurrent="1" nextAc="seek">
-              <p:cTn id="2" dur="indefinite" nodeType="mainSeq">
-                <p:childTnLst>
-                  <p:par>
-                    <p:cTn id="3" fill="hold">
-                      <p:stCondLst>
-                        <p:cond delay="indefinite"/>
-                      </p:stCondLst>
-                      <p:childTnLst>
-                        <p:par>
-                          <p:cTn id="4" fill="hold">
-                            <p:stCondLst>
-                              <p:cond delay="0"/>
-                            </p:stCondLst>
-                            <p:childTnLst>
-                              <p:par>
-                                <p:cTn id="5" presetID="1" presetClass="exit" presetSubtype="0" fill="hold" nodeType="clickEffect">
-                                  <p:stCondLst>
-                                    <p:cond delay="0"/>
-                                  </p:stCondLst>
-                                  <p:childTnLst>
-                                    <p:set>
-                                      <p:cBhvr>
-                                        <p:cTn id="6" dur="1" fill="hold">
-                                          <p:stCondLst>
-                                            <p:cond delay="0"/>
-                                          </p:stCondLst>
-                                        </p:cTn>
-                                        <p:tgtEl>
-                                          <p:spTgt spid="5"/>
-                                        </p:tgtEl>
-                                        <p:attrNameLst>
-                                          <p:attrName>style.visibility</p:attrName>
-                                        </p:attrNameLst>
-                                      </p:cBhvr>
-                                      <p:to>
-                                        <p:strVal val="hidden"/>
-                                      </p:to>
-                                    </p:set>
-                                  </p:childTnLst>
-                                </p:cTn>
-                              </p:par>
-                              <p:par>
-                                <p:cTn id="7" presetID="1" presetClass="entr" presetSubtype="0" fill="hold" nodeType="withEffect">
-                                  <p:stCondLst>
-                                    <p:cond delay="0"/>
-                                  </p:stCondLst>
-                                  <p:childTnLst>
-                                    <p:set>
-                                      <p:cBhvr>
-                                        <p:cTn id="8" dur="1" fill="hold">
-                                          <p:stCondLst>
-                                            <p:cond delay="0"/>
-                                          </p:stCondLst>
-                                        </p:cTn>
-                                        <p:tgtEl>
-                                          <p:spTgt spid="6"/>
-                                        </p:tgtEl>
-                                        <p:attrNameLst>
-                                          <p:attrName>style.visibility</p:attrName>
-                                        </p:attrNameLst>
-                                      </p:cBhvr>
-                                      <p:to>
-                                        <p:strVal val="visible"/>
-                                      </p:to>
-                                    </p:set>
-                                  </p:childTnLst>
-                                </p:cTn>
-                              </p:par>
-                            </p:childTnLst>
-                          </p:cTn>
-                        </p:par>
-                      </p:childTnLst>
-                    </p:cTn>
-                  </p:par>
-                  <p:par>
-                    <p:cTn id="9" fill="hold">
-                      <p:stCondLst>
-                        <p:cond delay="indefinite"/>
-                      </p:stCondLst>
-                      <p:childTnLst>
-                        <p:par>
-                          <p:cTn id="10" fill="hold">
-                            <p:stCondLst>
-                              <p:cond delay="0"/>
-                            </p:stCondLst>
-                            <p:childTnLst>
-                              <p:par>
-                                <p:cTn id="11" presetID="1" presetClass="entr" presetSubtype="0" fill="hold" nodeType="clickEffect">
-                                  <p:stCondLst>
-                                    <p:cond delay="0"/>
-                                  </p:stCondLst>
-                                  <p:childTnLst>
-                                    <p:set>
-                                      <p:cBhvr>
-                                        <p:cTn id="12" dur="1" fill="hold">
-                                          <p:stCondLst>
-                                            <p:cond delay="0"/>
-                                          </p:stCondLst>
-                                        </p:cTn>
-                                        <p:tgtEl>
-                                          <p:spTgt spid="7"/>
-                                        </p:tgtEl>
-                                        <p:attrNameLst>
-                                          <p:attrName>style.visibility</p:attrName>
-                                        </p:attrNameLst>
-                                      </p:cBhvr>
-                                      <p:to>
-                                        <p:strVal val="visible"/>
-                                      </p:to>
-                                    </p:set>
-                                  </p:childTnLst>
-                                </p:cTn>
-                              </p:par>
-                              <p:par>
-                                <p:cTn id="13" presetID="1" presetClass="exit" presetSubtype="0" fill="hold" nodeType="withEffect">
-                                  <p:stCondLst>
-                                    <p:cond delay="0"/>
-                                  </p:stCondLst>
-                                  <p:childTnLst>
-                                    <p:set>
-                                      <p:cBhvr>
-                                        <p:cTn id="14" dur="1" fill="hold">
-                                          <p:stCondLst>
-                                            <p:cond delay="0"/>
-                                          </p:stCondLst>
-                                        </p:cTn>
-                                        <p:tgtEl>
-                                          <p:spTgt spid="6"/>
-                                        </p:tgtEl>
-                                        <p:attrNameLst>
-                                          <p:attrName>style.visibility</p:attrName>
-                                        </p:attrNameLst>
-                                      </p:cBhvr>
-                                      <p:to>
-                                        <p:strVal val="hidden"/>
-                                      </p:to>
-                                    </p:set>
-                                  </p:childTnLst>
-                                </p:cTn>
-                              </p:par>
-                            </p:childTnLst>
-                          </p:cTn>
-                        </p:par>
-                      </p:childTnLst>
-                    </p:cTn>
-                  </p:par>
-                  <p:par>
-                    <p:cTn id="15" fill="hold">
-                      <p:stCondLst>
-                        <p:cond delay="indefinite"/>
-                      </p:stCondLst>
-                      <p:childTnLst>
-                        <p:par>
-                          <p:cTn id="16" fill="hold">
-                            <p:stCondLst>
-                              <p:cond delay="0"/>
-                            </p:stCondLst>
-                            <p:childTnLst>
-                              <p:par>
-                                <p:cTn id="17" presetID="1" presetClass="entr" presetSubtype="0" fill="hold" nodeType="clickEffect">
-                                  <p:stCondLst>
-                                    <p:cond delay="0"/>
-                                  </p:stCondLst>
-                                  <p:childTnLst>
-                                    <p:set>
-                                      <p:cBhvr>
-                                        <p:cTn id="18" dur="1" fill="hold">
-                                          <p:stCondLst>
-                                            <p:cond delay="0"/>
-                                          </p:stCondLst>
-                                        </p:cTn>
-                                        <p:tgtEl>
-                                          <p:spTgt spid="8"/>
-                                        </p:tgtEl>
-                                        <p:attrNameLst>
-                                          <p:attrName>style.visibility</p:attrName>
-                                        </p:attrNameLst>
-                                      </p:cBhvr>
-                                      <p:to>
-                                        <p:strVal val="visible"/>
-                                      </p:to>
-                                    </p:set>
-                                  </p:childTnLst>
-                                </p:cTn>
-                              </p:par>
-                              <p:par>
-                                <p:cTn id="19" presetID="1" presetClass="exit" presetSubtype="0" fill="hold" nodeType="withEffect">
-                                  <p:stCondLst>
-                                    <p:cond delay="0"/>
-                                  </p:stCondLst>
-                                  <p:childTnLst>
-                                    <p:set>
-                                      <p:cBhvr>
-                                        <p:cTn id="20" dur="1" fill="hold">
-                                          <p:stCondLst>
-                                            <p:cond delay="0"/>
-                                          </p:stCondLst>
-                                        </p:cTn>
-                                        <p:tgtEl>
-                                          <p:spTgt spid="7"/>
-                                        </p:tgtEl>
-                                        <p:attrNameLst>
-                                          <p:attrName>style.visibility</p:attrName>
-                                        </p:attrNameLst>
-                                      </p:cBhvr>
-                                      <p:to>
-                                        <p:strVal val="hidden"/>
-                                      </p:to>
-                                    </p:set>
-                                  </p:childTnLst>
-                                </p:cTn>
-                              </p:par>
-                            </p:childTnLst>
-                          </p:cTn>
-                        </p:par>
-                      </p:childTnLst>
-                    </p:cTn>
-                  </p:par>
-                </p:childTnLst>
-              </p:cTn>
-              <p:prevCondLst>
-                <p:cond evt="onPrev" delay="0">
-                  <p:tgtEl>
-                    <p:sldTgt/>
-                  </p:tgtEl>
-                </p:cond>
-              </p:prevCondLst>
-              <p:nextCondLst>
-                <p:cond evt="onNext" delay="0">
-                  <p:tgtEl>
-                    <p:sldTgt/>
-                  </p:tgtEl>
-                </p:cond>
-              </p:nextCondLst>
-            </p:seq>
-          </p:childTnLst>
-        </p:cTn>
-      </p:par>
-    </p:tnLst>
   </p:timing>
 </p:sld>
 </file>

</xml_diff>